<commit_message>
edits to paper corresponding to additions and added percent correct
</commit_message>
<xml_diff>
--- a/paper/images/images.pptx
+++ b/paper/images/images.pptx
@@ -291,7 +291,7 @@
           <a:p>
             <a:fld id="{554C80B5-1734-4FC9-8F72-0C7543F7E92B}" type="datetimeFigureOut">
               <a:rPr lang="en-US" smtClean="0"/>
-              <a:t>10/9/2013</a:t>
+              <a:t>11/6/2013</a:t>
             </a:fld>
             <a:endParaRPr lang="en-US"/>
           </a:p>
@@ -461,7 +461,7 @@
           <a:p>
             <a:fld id="{554C80B5-1734-4FC9-8F72-0C7543F7E92B}" type="datetimeFigureOut">
               <a:rPr lang="en-US" smtClean="0"/>
-              <a:t>10/9/2013</a:t>
+              <a:t>11/6/2013</a:t>
             </a:fld>
             <a:endParaRPr lang="en-US"/>
           </a:p>
@@ -641,7 +641,7 @@
           <a:p>
             <a:fld id="{554C80B5-1734-4FC9-8F72-0C7543F7E92B}" type="datetimeFigureOut">
               <a:rPr lang="en-US" smtClean="0"/>
-              <a:t>10/9/2013</a:t>
+              <a:t>11/6/2013</a:t>
             </a:fld>
             <a:endParaRPr lang="en-US"/>
           </a:p>
@@ -811,7 +811,7 @@
           <a:p>
             <a:fld id="{554C80B5-1734-4FC9-8F72-0C7543F7E92B}" type="datetimeFigureOut">
               <a:rPr lang="en-US" smtClean="0"/>
-              <a:t>10/9/2013</a:t>
+              <a:t>11/6/2013</a:t>
             </a:fld>
             <a:endParaRPr lang="en-US"/>
           </a:p>
@@ -1057,7 +1057,7 @@
           <a:p>
             <a:fld id="{554C80B5-1734-4FC9-8F72-0C7543F7E92B}" type="datetimeFigureOut">
               <a:rPr lang="en-US" smtClean="0"/>
-              <a:t>10/9/2013</a:t>
+              <a:t>11/6/2013</a:t>
             </a:fld>
             <a:endParaRPr lang="en-US"/>
           </a:p>
@@ -1345,7 +1345,7 @@
           <a:p>
             <a:fld id="{554C80B5-1734-4FC9-8F72-0C7543F7E92B}" type="datetimeFigureOut">
               <a:rPr lang="en-US" smtClean="0"/>
-              <a:t>10/9/2013</a:t>
+              <a:t>11/6/2013</a:t>
             </a:fld>
             <a:endParaRPr lang="en-US"/>
           </a:p>
@@ -1767,7 +1767,7 @@
           <a:p>
             <a:fld id="{554C80B5-1734-4FC9-8F72-0C7543F7E92B}" type="datetimeFigureOut">
               <a:rPr lang="en-US" smtClean="0"/>
-              <a:t>10/9/2013</a:t>
+              <a:t>11/6/2013</a:t>
             </a:fld>
             <a:endParaRPr lang="en-US"/>
           </a:p>
@@ -1885,7 +1885,7 @@
           <a:p>
             <a:fld id="{554C80B5-1734-4FC9-8F72-0C7543F7E92B}" type="datetimeFigureOut">
               <a:rPr lang="en-US" smtClean="0"/>
-              <a:t>10/9/2013</a:t>
+              <a:t>11/6/2013</a:t>
             </a:fld>
             <a:endParaRPr lang="en-US"/>
           </a:p>
@@ -1980,7 +1980,7 @@
           <a:p>
             <a:fld id="{554C80B5-1734-4FC9-8F72-0C7543F7E92B}" type="datetimeFigureOut">
               <a:rPr lang="en-US" smtClean="0"/>
-              <a:t>10/9/2013</a:t>
+              <a:t>11/6/2013</a:t>
             </a:fld>
             <a:endParaRPr lang="en-US"/>
           </a:p>
@@ -2257,7 +2257,7 @@
           <a:p>
             <a:fld id="{554C80B5-1734-4FC9-8F72-0C7543F7E92B}" type="datetimeFigureOut">
               <a:rPr lang="en-US" smtClean="0"/>
-              <a:t>10/9/2013</a:t>
+              <a:t>11/6/2013</a:t>
             </a:fld>
             <a:endParaRPr lang="en-US"/>
           </a:p>
@@ -2510,7 +2510,7 @@
           <a:p>
             <a:fld id="{554C80B5-1734-4FC9-8F72-0C7543F7E92B}" type="datetimeFigureOut">
               <a:rPr lang="en-US" smtClean="0"/>
-              <a:t>10/9/2013</a:t>
+              <a:t>11/6/2013</a:t>
             </a:fld>
             <a:endParaRPr lang="en-US"/>
           </a:p>
@@ -2723,7 +2723,7 @@
           <a:p>
             <a:fld id="{554C80B5-1734-4FC9-8F72-0C7543F7E92B}" type="datetimeFigureOut">
               <a:rPr lang="en-US" smtClean="0"/>
-              <a:t>10/9/2013</a:t>
+              <a:t>11/6/2013</a:t>
             </a:fld>
             <a:endParaRPr lang="en-US"/>
           </a:p>
@@ -6953,7 +6953,7 @@
       </p:grpSpPr>
       <p:pic>
         <p:nvPicPr>
-          <p:cNvPr id="1026" name="Picture 2"/>
+          <p:cNvPr id="1027" name="Picture 3"/>
           <p:cNvPicPr>
             <a:picLocks noChangeAspect="1" noChangeArrowheads="1"/>
           </p:cNvPicPr>
@@ -6974,8 +6974,8 @@
         </p:blipFill>
         <p:spPr bwMode="auto">
           <a:xfrm>
-            <a:off x="21266" y="799673"/>
-            <a:ext cx="9144000" cy="4000927"/>
+            <a:off x="10633" y="696433"/>
+            <a:ext cx="9144000" cy="3808303"/>
           </a:xfrm>
           <a:prstGeom prst="rect">
             <a:avLst/>
@@ -7013,8 +7013,8 @@
         </p:nvSpPr>
         <p:spPr>
           <a:xfrm>
-            <a:off x="-10634" y="1144769"/>
-            <a:ext cx="3058633" cy="3069266"/>
+            <a:off x="-10634" y="1066800"/>
+            <a:ext cx="3058633" cy="3352800"/>
           </a:xfrm>
           <a:prstGeom prst="rect">
             <a:avLst/>
@@ -7059,8 +7059,8 @@
         </p:nvSpPr>
         <p:spPr>
           <a:xfrm>
-            <a:off x="141767" y="2438399"/>
-            <a:ext cx="2601433" cy="609601"/>
+            <a:off x="141767" y="2362200"/>
+            <a:ext cx="2601433" cy="806301"/>
           </a:xfrm>
           <a:prstGeom prst="rect">
             <a:avLst/>
@@ -7105,8 +7105,8 @@
         </p:nvSpPr>
         <p:spPr>
           <a:xfrm>
-            <a:off x="141767" y="3168501"/>
-            <a:ext cx="2601433" cy="565299"/>
+            <a:off x="141767" y="3211033"/>
+            <a:ext cx="2601433" cy="675167"/>
           </a:xfrm>
           <a:prstGeom prst="rect">
             <a:avLst/>
@@ -7151,7 +7151,7 @@
         </p:nvSpPr>
         <p:spPr>
           <a:xfrm>
-            <a:off x="3200400" y="1600200"/>
+            <a:off x="3157868" y="1502734"/>
             <a:ext cx="5791200" cy="3200400"/>
           </a:xfrm>
           <a:prstGeom prst="rect">
@@ -7197,7 +7197,7 @@
         </p:nvSpPr>
         <p:spPr>
           <a:xfrm>
-            <a:off x="3200400" y="1187300"/>
+            <a:off x="3157868" y="1144768"/>
             <a:ext cx="914400" cy="265245"/>
           </a:xfrm>
           <a:prstGeom prst="rect">
@@ -7243,7 +7243,7 @@
         </p:nvSpPr>
         <p:spPr>
           <a:xfrm>
-            <a:off x="21266" y="1187301"/>
+            <a:off x="21266" y="1091604"/>
             <a:ext cx="228600" cy="230369"/>
           </a:xfrm>
           <a:prstGeom prst="ellipse">
@@ -7289,7 +7289,7 @@
         </p:nvSpPr>
         <p:spPr>
           <a:xfrm>
-            <a:off x="0" y="1144769"/>
+            <a:off x="0" y="1033306"/>
             <a:ext cx="228600" cy="307777"/>
           </a:xfrm>
           <a:prstGeom prst="rect">
@@ -7327,7 +7327,7 @@
         </p:nvSpPr>
         <p:spPr>
           <a:xfrm>
-            <a:off x="2470299" y="2477955"/>
+            <a:off x="2470299" y="2401755"/>
             <a:ext cx="228600" cy="230369"/>
           </a:xfrm>
           <a:prstGeom prst="ellipse">
@@ -7373,7 +7373,7 @@
         </p:nvSpPr>
         <p:spPr>
           <a:xfrm>
-            <a:off x="2449033" y="2435423"/>
+            <a:off x="2449033" y="2354090"/>
             <a:ext cx="228600" cy="307777"/>
           </a:xfrm>
           <a:prstGeom prst="rect">
@@ -7411,7 +7411,7 @@
         </p:nvSpPr>
         <p:spPr>
           <a:xfrm>
-            <a:off x="2472957" y="3211033"/>
+            <a:off x="2472957" y="3239955"/>
             <a:ext cx="228600" cy="230369"/>
           </a:xfrm>
           <a:prstGeom prst="ellipse">
@@ -7457,7 +7457,7 @@
         </p:nvSpPr>
         <p:spPr>
           <a:xfrm>
-            <a:off x="2462324" y="3168501"/>
+            <a:off x="2451691" y="3197423"/>
             <a:ext cx="228600" cy="307777"/>
           </a:xfrm>
           <a:prstGeom prst="rect">
@@ -7490,7 +7490,7 @@
         </p:nvSpPr>
         <p:spPr>
           <a:xfrm>
-            <a:off x="3233185" y="1647477"/>
+            <a:off x="3190653" y="1550011"/>
             <a:ext cx="228600" cy="230369"/>
           </a:xfrm>
           <a:prstGeom prst="ellipse">
@@ -7536,7 +7536,7 @@
         </p:nvSpPr>
         <p:spPr>
           <a:xfrm>
-            <a:off x="3201286" y="1604945"/>
+            <a:off x="3158754" y="1507479"/>
             <a:ext cx="228600" cy="307777"/>
           </a:xfrm>
           <a:prstGeom prst="rect">
@@ -7569,7 +7569,7 @@
         </p:nvSpPr>
         <p:spPr>
           <a:xfrm>
-            <a:off x="4160870" y="1176668"/>
+            <a:off x="4118338" y="1134136"/>
             <a:ext cx="228600" cy="230369"/>
           </a:xfrm>
           <a:prstGeom prst="ellipse">
@@ -7615,7 +7615,7 @@
         </p:nvSpPr>
         <p:spPr>
           <a:xfrm>
-            <a:off x="4139604" y="1134136"/>
+            <a:off x="4097072" y="1091604"/>
             <a:ext cx="228600" cy="307777"/>
           </a:xfrm>
           <a:prstGeom prst="rect">

</xml_diff>

<commit_message>
so much left to do
</commit_message>
<xml_diff>
--- a/paper/images/images.pptx
+++ b/paper/images/images.pptx
@@ -5,14 +5,15 @@
     <p:sldMasterId id="2147483648" r:id="rId1"/>
   </p:sldMasterIdLst>
   <p:notesMasterIdLst>
-    <p:notesMasterId r:id="rId7"/>
+    <p:notesMasterId r:id="rId8"/>
   </p:notesMasterIdLst>
   <p:sldIdLst>
     <p:sldId id="259" r:id="rId2"/>
     <p:sldId id="256" r:id="rId3"/>
     <p:sldId id="257" r:id="rId4"/>
-    <p:sldId id="258" r:id="rId5"/>
-    <p:sldId id="260" r:id="rId6"/>
+    <p:sldId id="261" r:id="rId5"/>
+    <p:sldId id="258" r:id="rId6"/>
+    <p:sldId id="260" r:id="rId7"/>
   </p:sldIdLst>
   <p:sldSz cx="9144000" cy="6858000" type="screen4x3"/>
   <p:notesSz cx="6858000" cy="9144000"/>
@@ -119,6 +120,7 @@
             <p14:sldId id="259"/>
             <p14:sldId id="256"/>
             <p14:sldId id="257"/>
+            <p14:sldId id="261"/>
             <p14:sldId id="258"/>
             <p14:sldId id="260"/>
           </p14:sldIdLst>
@@ -544,7 +546,7 @@
           <a:p>
             <a:fld id="{3D91AC6F-76E5-488C-8CF5-8448FF75D1AD}" type="slidenum">
               <a:rPr lang="en-US" smtClean="0"/>
-              <a:t>5</a:t>
+              <a:t>6</a:t>
             </a:fld>
             <a:endParaRPr lang="en-US"/>
           </a:p>
@@ -7406,7 +7408,7 @@
       </p:grpSpPr>
       <p:pic>
         <p:nvPicPr>
-          <p:cNvPr id="1027" name="Picture 3"/>
+          <p:cNvPr id="1026" name="Picture 2" descr="C:\Users\Andee\Documents\GitHub\CreativeComponent\paper\images\graphdrag.png"/>
           <p:cNvPicPr>
             <a:picLocks noChangeAspect="1" noChangeArrowheads="1"/>
           </p:cNvPicPr>
@@ -7427,8 +7429,49 @@
         </p:blipFill>
         <p:spPr bwMode="auto">
           <a:xfrm>
-            <a:off x="10633" y="696433"/>
-            <a:ext cx="9144000" cy="3808303"/>
+            <a:off x="303213" y="628650"/>
+            <a:ext cx="8535987" cy="5600700"/>
+          </a:xfrm>
+          <a:prstGeom prst="rect">
+            <a:avLst/>
+          </a:prstGeom>
+          <a:noFill/>
+          <a:extLst>
+            <a:ext uri="{909E8E84-426E-40DD-AFC4-6F175D3DCCD1}">
+              <a14:hiddenFill xmlns:a14="http://schemas.microsoft.com/office/drawing/2010/main">
+                <a:solidFill>
+                  <a:srgbClr val="FFFFFF"/>
+                </a:solidFill>
+              </a14:hiddenFill>
+            </a:ext>
+          </a:extLst>
+        </p:spPr>
+      </p:pic>
+      <p:pic>
+        <p:nvPicPr>
+          <p:cNvPr id="1027" name="Picture 3"/>
+          <p:cNvPicPr>
+            <a:picLocks noChangeAspect="1" noChangeArrowheads="1"/>
+          </p:cNvPicPr>
+          <p:nvPr/>
+        </p:nvPicPr>
+        <p:blipFill>
+          <a:blip r:embed="rId3">
+            <a:extLst>
+              <a:ext uri="{28A0092B-C50C-407E-A947-70E740481C1C}">
+                <a14:useLocalDpi xmlns:a14="http://schemas.microsoft.com/office/drawing/2010/main" val="0"/>
+              </a:ext>
+            </a:extLst>
+          </a:blip>
+          <a:srcRect/>
+          <a:stretch>
+            <a:fillRect/>
+          </a:stretch>
+        </p:blipFill>
+        <p:spPr bwMode="auto">
+          <a:xfrm>
+            <a:off x="8033025" y="2050200"/>
+            <a:ext cx="571500" cy="485775"/>
           </a:xfrm>
           <a:prstGeom prst="rect">
             <a:avLst/>
@@ -7460,6 +7503,136 @@
       </p:pic>
       <p:sp>
         <p:nvSpPr>
+          <p:cNvPr id="6" name="Oval 5"/>
+          <p:cNvSpPr/>
+          <p:nvPr/>
+        </p:nvSpPr>
+        <p:spPr>
+          <a:xfrm>
+            <a:off x="8003642" y="1858176"/>
+            <a:ext cx="192024" cy="192024"/>
+          </a:xfrm>
+          <a:prstGeom prst="ellipse">
+            <a:avLst/>
+          </a:prstGeom>
+          <a:noFill/>
+          <a:ln w="38100">
+            <a:solidFill>
+              <a:schemeClr val="accent2"/>
+            </a:solidFill>
+          </a:ln>
+        </p:spPr>
+        <p:style>
+          <a:lnRef idx="2">
+            <a:schemeClr val="accent1">
+              <a:shade val="50000"/>
+            </a:schemeClr>
+          </a:lnRef>
+          <a:fillRef idx="1">
+            <a:schemeClr val="accent1"/>
+          </a:fillRef>
+          <a:effectRef idx="0">
+            <a:schemeClr val="accent1"/>
+          </a:effectRef>
+          <a:fontRef idx="minor">
+            <a:schemeClr val="lt1"/>
+          </a:fontRef>
+        </p:style>
+        <p:txBody>
+          <a:bodyPr rtlCol="0" anchor="ctr"/>
+          <a:lstStyle/>
+          <a:p>
+            <a:pPr algn="ctr"/>
+            <a:endParaRPr lang="en-US"/>
+          </a:p>
+        </p:txBody>
+      </p:sp>
+    </p:spTree>
+    <p:extLst>
+      <p:ext uri="{BB962C8B-B14F-4D97-AF65-F5344CB8AC3E}">
+        <p14:creationId xmlns:p14="http://schemas.microsoft.com/office/powerpoint/2010/main" val="2522856404"/>
+      </p:ext>
+    </p:extLst>
+  </p:cSld>
+  <p:clrMapOvr>
+    <a:masterClrMapping/>
+  </p:clrMapOvr>
+</p:sld>
+</file>
+
+<file path=ppt/slides/slide5.xml><?xml version="1.0" encoding="utf-8"?>
+<p:sld xmlns:a="http://schemas.openxmlformats.org/drawingml/2006/main" xmlns:r="http://schemas.openxmlformats.org/officeDocument/2006/relationships" xmlns:p="http://schemas.openxmlformats.org/presentationml/2006/main">
+  <p:cSld>
+    <p:spTree>
+      <p:nvGrpSpPr>
+        <p:cNvPr id="1" name=""/>
+        <p:cNvGrpSpPr/>
+        <p:nvPr/>
+      </p:nvGrpSpPr>
+      <p:grpSpPr>
+        <a:xfrm>
+          <a:off x="0" y="0"/>
+          <a:ext cx="0" cy="0"/>
+          <a:chOff x="0" y="0"/>
+          <a:chExt cx="0" cy="0"/>
+        </a:xfrm>
+      </p:grpSpPr>
+      <p:pic>
+        <p:nvPicPr>
+          <p:cNvPr id="1027" name="Picture 3"/>
+          <p:cNvPicPr>
+            <a:picLocks noChangeAspect="1" noChangeArrowheads="1"/>
+          </p:cNvPicPr>
+          <p:nvPr/>
+        </p:nvPicPr>
+        <p:blipFill>
+          <a:blip r:embed="rId2">
+            <a:extLst>
+              <a:ext uri="{28A0092B-C50C-407E-A947-70E740481C1C}">
+                <a14:useLocalDpi xmlns:a14="http://schemas.microsoft.com/office/drawing/2010/main" val="0"/>
+              </a:ext>
+            </a:extLst>
+          </a:blip>
+          <a:srcRect/>
+          <a:stretch>
+            <a:fillRect/>
+          </a:stretch>
+        </p:blipFill>
+        <p:spPr bwMode="auto">
+          <a:xfrm>
+            <a:off x="10633" y="696433"/>
+            <a:ext cx="9144000" cy="3808303"/>
+          </a:xfrm>
+          <a:prstGeom prst="rect">
+            <a:avLst/>
+          </a:prstGeom>
+          <a:noFill/>
+          <a:ln>
+            <a:noFill/>
+          </a:ln>
+          <a:extLst>
+            <a:ext uri="{909E8E84-426E-40DD-AFC4-6F175D3DCCD1}">
+              <a14:hiddenFill xmlns:a14="http://schemas.microsoft.com/office/drawing/2010/main">
+                <a:solidFill>
+                  <a:schemeClr val="accent1"/>
+                </a:solidFill>
+              </a14:hiddenFill>
+            </a:ext>
+            <a:ext uri="{91240B29-F687-4F45-9708-019B960494DF}">
+              <a14:hiddenLine xmlns:a14="http://schemas.microsoft.com/office/drawing/2010/main" w="9525">
+                <a:solidFill>
+                  <a:schemeClr val="tx1"/>
+                </a:solidFill>
+                <a:miter lim="800000"/>
+                <a:headEnd/>
+                <a:tailEnd/>
+              </a14:hiddenLine>
+            </a:ext>
+          </a:extLst>
+        </p:spPr>
+      </p:pic>
+      <p:sp>
+        <p:nvSpPr>
           <p:cNvPr id="2" name="Rectangle 1"/>
           <p:cNvSpPr/>
           <p:nvPr/>
@@ -8111,7 +8284,7 @@
 </p:sld>
 </file>
 
-<file path=ppt/slides/slide5.xml><?xml version="1.0" encoding="utf-8"?>
+<file path=ppt/slides/slide6.xml><?xml version="1.0" encoding="utf-8"?>
 <p:sld xmlns:a="http://schemas.openxmlformats.org/drawingml/2006/main" xmlns:r="http://schemas.openxmlformats.org/officeDocument/2006/relationships" xmlns:p="http://schemas.openxmlformats.org/presentationml/2006/main">
   <p:cSld>
     <p:spTree>
@@ -10065,11 +10238,6 @@
                 </a:rPr>
                 <a:t>5</a:t>
               </a:r>
-              <a:endParaRPr lang="en-US" sz="1400" dirty="0">
-                <a:solidFill>
-                  <a:schemeClr val="bg1"/>
-                </a:solidFill>
-              </a:endParaRPr>
             </a:p>
           </p:txBody>
         </p:sp>
@@ -10149,11 +10317,6 @@
                 </a:rPr>
                 <a:t>9</a:t>
               </a:r>
-              <a:endParaRPr lang="en-US" sz="1400" dirty="0">
-                <a:solidFill>
-                  <a:schemeClr val="bg1"/>
-                </a:solidFill>
-              </a:endParaRPr>
             </a:p>
           </p:txBody>
         </p:sp>
@@ -10485,11 +10648,6 @@
                 </a:rPr>
                 <a:t>8</a:t>
               </a:r>
-              <a:endParaRPr lang="en-US" sz="1400" dirty="0">
-                <a:solidFill>
-                  <a:schemeClr val="bg1"/>
-                </a:solidFill>
-              </a:endParaRPr>
             </a:p>
           </p:txBody>
         </p:sp>
@@ -10569,11 +10727,6 @@
                 </a:rPr>
                 <a:t>7</a:t>
               </a:r>
-              <a:endParaRPr lang="en-US" sz="1400" dirty="0">
-                <a:solidFill>
-                  <a:schemeClr val="bg1"/>
-                </a:solidFill>
-              </a:endParaRPr>
             </a:p>
           </p:txBody>
         </p:sp>
@@ -10653,11 +10806,6 @@
                 </a:rPr>
                 <a:t>6</a:t>
               </a:r>
-              <a:endParaRPr lang="en-US" sz="1400" dirty="0">
-                <a:solidFill>
-                  <a:schemeClr val="bg1"/>
-                </a:solidFill>
-              </a:endParaRPr>
             </a:p>
           </p:txBody>
         </p:sp>
@@ -10737,11 +10885,6 @@
                 </a:rPr>
                 <a:t>2</a:t>
               </a:r>
-              <a:endParaRPr lang="en-US" sz="1400" dirty="0">
-                <a:solidFill>
-                  <a:schemeClr val="bg1"/>
-                </a:solidFill>
-              </a:endParaRPr>
             </a:p>
           </p:txBody>
         </p:sp>
@@ -10821,11 +10964,6 @@
                 </a:rPr>
                 <a:t>3</a:t>
               </a:r>
-              <a:endParaRPr lang="en-US" sz="1400" dirty="0">
-                <a:solidFill>
-                  <a:schemeClr val="bg1"/>
-                </a:solidFill>
-              </a:endParaRPr>
             </a:p>
           </p:txBody>
         </p:sp>
@@ -10905,15 +11043,922 @@
                 </a:rPr>
                 <a:t>4</a:t>
               </a:r>
-              <a:endParaRPr lang="en-US" sz="1400" dirty="0">
-                <a:solidFill>
-                  <a:schemeClr val="bg1"/>
-                </a:solidFill>
-              </a:endParaRPr>
             </a:p>
           </p:txBody>
         </p:sp>
       </p:grpSp>
+      <p:sp>
+        <p:nvSpPr>
+          <p:cNvPr id="2" name="Rounded Rectangle 1"/>
+          <p:cNvSpPr/>
+          <p:nvPr/>
+        </p:nvSpPr>
+        <p:spPr>
+          <a:xfrm>
+            <a:off x="2805876" y="861118"/>
+            <a:ext cx="478296" cy="137160"/>
+          </a:xfrm>
+          <a:prstGeom prst="roundRect">
+            <a:avLst/>
+          </a:prstGeom>
+          <a:solidFill>
+            <a:schemeClr val="bg1">
+              <a:lumMod val="95000"/>
+            </a:schemeClr>
+          </a:solidFill>
+          <a:ln w="3175">
+            <a:solidFill>
+              <a:schemeClr val="tx1">
+                <a:lumMod val="65000"/>
+                <a:lumOff val="35000"/>
+              </a:schemeClr>
+            </a:solidFill>
+          </a:ln>
+          <a:effectLst/>
+        </p:spPr>
+        <p:style>
+          <a:lnRef idx="2">
+            <a:schemeClr val="accent1">
+              <a:shade val="50000"/>
+            </a:schemeClr>
+          </a:lnRef>
+          <a:fillRef idx="1">
+            <a:schemeClr val="accent1"/>
+          </a:fillRef>
+          <a:effectRef idx="0">
+            <a:schemeClr val="accent1"/>
+          </a:effectRef>
+          <a:fontRef idx="minor">
+            <a:schemeClr val="lt1"/>
+          </a:fontRef>
+        </p:style>
+        <p:txBody>
+          <a:bodyPr rtlCol="0" anchor="ctr"/>
+          <a:lstStyle/>
+          <a:p>
+            <a:pPr algn="ctr"/>
+            <a:r>
+              <a:rPr lang="en-US" sz="800" dirty="0" smtClean="0">
+                <a:solidFill>
+                  <a:schemeClr val="tx1">
+                    <a:lumMod val="65000"/>
+                    <a:lumOff val="35000"/>
+                  </a:schemeClr>
+                </a:solidFill>
+              </a:rPr>
+              <a:t>Big 10</a:t>
+            </a:r>
+            <a:endParaRPr lang="en-US" sz="800" dirty="0">
+              <a:solidFill>
+                <a:schemeClr val="tx1">
+                  <a:lumMod val="65000"/>
+                  <a:lumOff val="35000"/>
+                </a:schemeClr>
+              </a:solidFill>
+            </a:endParaRPr>
+          </a:p>
+        </p:txBody>
+      </p:sp>
+      <p:sp>
+        <p:nvSpPr>
+          <p:cNvPr id="95" name="Rounded Rectangle 94"/>
+          <p:cNvSpPr/>
+          <p:nvPr/>
+        </p:nvSpPr>
+        <p:spPr>
+          <a:xfrm>
+            <a:off x="5225383" y="1114822"/>
+            <a:ext cx="478296" cy="137160"/>
+          </a:xfrm>
+          <a:prstGeom prst="roundRect">
+            <a:avLst/>
+          </a:prstGeom>
+          <a:solidFill>
+            <a:schemeClr val="bg1">
+              <a:lumMod val="95000"/>
+            </a:schemeClr>
+          </a:solidFill>
+          <a:ln w="3175">
+            <a:solidFill>
+              <a:schemeClr val="tx1">
+                <a:lumMod val="65000"/>
+                <a:lumOff val="35000"/>
+              </a:schemeClr>
+            </a:solidFill>
+          </a:ln>
+          <a:effectLst/>
+        </p:spPr>
+        <p:style>
+          <a:lnRef idx="2">
+            <a:schemeClr val="accent1">
+              <a:shade val="50000"/>
+            </a:schemeClr>
+          </a:lnRef>
+          <a:fillRef idx="1">
+            <a:schemeClr val="accent1"/>
+          </a:fillRef>
+          <a:effectRef idx="0">
+            <a:schemeClr val="accent1"/>
+          </a:effectRef>
+          <a:fontRef idx="minor">
+            <a:schemeClr val="lt1"/>
+          </a:fontRef>
+        </p:style>
+        <p:txBody>
+          <a:bodyPr rtlCol="0" anchor="ctr"/>
+          <a:lstStyle/>
+          <a:p>
+            <a:pPr algn="ctr"/>
+            <a:r>
+              <a:rPr lang="en-US" sz="800" dirty="0" smtClean="0">
+                <a:solidFill>
+                  <a:schemeClr val="tx1">
+                    <a:lumMod val="65000"/>
+                    <a:lumOff val="35000"/>
+                  </a:schemeClr>
+                </a:solidFill>
+              </a:rPr>
+              <a:t>SEC</a:t>
+            </a:r>
+            <a:endParaRPr lang="en-US" sz="800" dirty="0">
+              <a:solidFill>
+                <a:schemeClr val="tx1">
+                  <a:lumMod val="65000"/>
+                  <a:lumOff val="35000"/>
+                </a:schemeClr>
+              </a:solidFill>
+            </a:endParaRPr>
+          </a:p>
+        </p:txBody>
+      </p:sp>
+      <p:sp>
+        <p:nvSpPr>
+          <p:cNvPr id="96" name="Rounded Rectangle 95"/>
+          <p:cNvSpPr/>
+          <p:nvPr/>
+        </p:nvSpPr>
+        <p:spPr>
+          <a:xfrm>
+            <a:off x="7021421" y="754438"/>
+            <a:ext cx="478296" cy="137160"/>
+          </a:xfrm>
+          <a:prstGeom prst="roundRect">
+            <a:avLst/>
+          </a:prstGeom>
+          <a:solidFill>
+            <a:schemeClr val="bg1">
+              <a:lumMod val="95000"/>
+            </a:schemeClr>
+          </a:solidFill>
+          <a:ln w="3175">
+            <a:solidFill>
+              <a:schemeClr val="tx1">
+                <a:lumMod val="65000"/>
+                <a:lumOff val="35000"/>
+              </a:schemeClr>
+            </a:solidFill>
+          </a:ln>
+          <a:effectLst/>
+        </p:spPr>
+        <p:style>
+          <a:lnRef idx="2">
+            <a:schemeClr val="accent1">
+              <a:shade val="50000"/>
+            </a:schemeClr>
+          </a:lnRef>
+          <a:fillRef idx="1">
+            <a:schemeClr val="accent1"/>
+          </a:fillRef>
+          <a:effectRef idx="0">
+            <a:schemeClr val="accent1"/>
+          </a:effectRef>
+          <a:fontRef idx="minor">
+            <a:schemeClr val="lt1"/>
+          </a:fontRef>
+        </p:style>
+        <p:txBody>
+          <a:bodyPr rtlCol="0" anchor="ctr"/>
+          <a:lstStyle/>
+          <a:p>
+            <a:pPr algn="ctr"/>
+            <a:r>
+              <a:rPr lang="en-US" sz="800" dirty="0" smtClean="0">
+                <a:solidFill>
+                  <a:schemeClr val="tx1">
+                    <a:lumMod val="65000"/>
+                    <a:lumOff val="35000"/>
+                  </a:schemeClr>
+                </a:solidFill>
+              </a:rPr>
+              <a:t>MAC</a:t>
+            </a:r>
+            <a:endParaRPr lang="en-US" sz="800" dirty="0">
+              <a:solidFill>
+                <a:schemeClr val="tx1">
+                  <a:lumMod val="65000"/>
+                  <a:lumOff val="35000"/>
+                </a:schemeClr>
+              </a:solidFill>
+            </a:endParaRPr>
+          </a:p>
+        </p:txBody>
+      </p:sp>
+      <p:sp>
+        <p:nvSpPr>
+          <p:cNvPr id="97" name="Rounded Rectangle 96"/>
+          <p:cNvSpPr/>
+          <p:nvPr/>
+        </p:nvSpPr>
+        <p:spPr>
+          <a:xfrm>
+            <a:off x="1014057" y="3253435"/>
+            <a:ext cx="586620" cy="137160"/>
+          </a:xfrm>
+          <a:prstGeom prst="roundRect">
+            <a:avLst/>
+          </a:prstGeom>
+          <a:solidFill>
+            <a:schemeClr val="bg1">
+              <a:lumMod val="95000"/>
+            </a:schemeClr>
+          </a:solidFill>
+          <a:ln w="3175">
+            <a:solidFill>
+              <a:schemeClr val="tx1">
+                <a:lumMod val="65000"/>
+                <a:lumOff val="35000"/>
+              </a:schemeClr>
+            </a:solidFill>
+          </a:ln>
+          <a:effectLst/>
+        </p:spPr>
+        <p:style>
+          <a:lnRef idx="2">
+            <a:schemeClr val="accent1">
+              <a:shade val="50000"/>
+            </a:schemeClr>
+          </a:lnRef>
+          <a:fillRef idx="1">
+            <a:schemeClr val="accent1"/>
+          </a:fillRef>
+          <a:effectRef idx="0">
+            <a:schemeClr val="accent1"/>
+          </a:effectRef>
+          <a:fontRef idx="minor">
+            <a:schemeClr val="lt1"/>
+          </a:fontRef>
+        </p:style>
+        <p:txBody>
+          <a:bodyPr rtlCol="0" anchor="ctr"/>
+          <a:lstStyle/>
+          <a:p>
+            <a:pPr algn="ctr"/>
+            <a:r>
+              <a:rPr lang="en-US" sz="800" dirty="0" smtClean="0">
+                <a:solidFill>
+                  <a:schemeClr val="tx1">
+                    <a:lumMod val="65000"/>
+                    <a:lumOff val="35000"/>
+                  </a:schemeClr>
+                </a:solidFill>
+              </a:rPr>
+              <a:t>Pac-10</a:t>
+            </a:r>
+            <a:endParaRPr lang="en-US" sz="800" dirty="0">
+              <a:solidFill>
+                <a:schemeClr val="tx1">
+                  <a:lumMod val="65000"/>
+                  <a:lumOff val="35000"/>
+                </a:schemeClr>
+              </a:solidFill>
+            </a:endParaRPr>
+          </a:p>
+        </p:txBody>
+      </p:sp>
+      <p:sp>
+        <p:nvSpPr>
+          <p:cNvPr id="99" name="Rounded Rectangle 98"/>
+          <p:cNvSpPr/>
+          <p:nvPr/>
+        </p:nvSpPr>
+        <p:spPr>
+          <a:xfrm>
+            <a:off x="3229744" y="2584090"/>
+            <a:ext cx="478296" cy="137160"/>
+          </a:xfrm>
+          <a:prstGeom prst="roundRect">
+            <a:avLst/>
+          </a:prstGeom>
+          <a:solidFill>
+            <a:schemeClr val="bg1">
+              <a:lumMod val="95000"/>
+            </a:schemeClr>
+          </a:solidFill>
+          <a:ln w="3175">
+            <a:solidFill>
+              <a:schemeClr val="tx1">
+                <a:lumMod val="65000"/>
+                <a:lumOff val="35000"/>
+              </a:schemeClr>
+            </a:solidFill>
+          </a:ln>
+          <a:effectLst/>
+        </p:spPr>
+        <p:style>
+          <a:lnRef idx="2">
+            <a:schemeClr val="accent1">
+              <a:shade val="50000"/>
+            </a:schemeClr>
+          </a:lnRef>
+          <a:fillRef idx="1">
+            <a:schemeClr val="accent1"/>
+          </a:fillRef>
+          <a:effectRef idx="0">
+            <a:schemeClr val="accent1"/>
+          </a:effectRef>
+          <a:fontRef idx="minor">
+            <a:schemeClr val="lt1"/>
+          </a:fontRef>
+        </p:style>
+        <p:txBody>
+          <a:bodyPr rtlCol="0" anchor="ctr"/>
+          <a:lstStyle/>
+          <a:p>
+            <a:pPr algn="ctr"/>
+            <a:r>
+              <a:rPr lang="en-US" sz="800" dirty="0" smtClean="0">
+                <a:solidFill>
+                  <a:schemeClr val="tx1">
+                    <a:lumMod val="65000"/>
+                    <a:lumOff val="35000"/>
+                  </a:schemeClr>
+                </a:solidFill>
+              </a:rPr>
+              <a:t>WAC</a:t>
+            </a:r>
+            <a:endParaRPr lang="en-US" sz="800" dirty="0">
+              <a:solidFill>
+                <a:schemeClr val="tx1">
+                  <a:lumMod val="65000"/>
+                  <a:lumOff val="35000"/>
+                </a:schemeClr>
+              </a:solidFill>
+            </a:endParaRPr>
+          </a:p>
+        </p:txBody>
+      </p:sp>
+      <p:sp>
+        <p:nvSpPr>
+          <p:cNvPr id="100" name="Rounded Rectangle 99"/>
+          <p:cNvSpPr/>
+          <p:nvPr/>
+        </p:nvSpPr>
+        <p:spPr>
+          <a:xfrm>
+            <a:off x="6853710" y="3329309"/>
+            <a:ext cx="478296" cy="137160"/>
+          </a:xfrm>
+          <a:prstGeom prst="roundRect">
+            <a:avLst/>
+          </a:prstGeom>
+          <a:solidFill>
+            <a:schemeClr val="bg1">
+              <a:lumMod val="95000"/>
+            </a:schemeClr>
+          </a:solidFill>
+          <a:ln w="3175">
+            <a:solidFill>
+              <a:schemeClr val="tx1">
+                <a:lumMod val="65000"/>
+                <a:lumOff val="35000"/>
+              </a:schemeClr>
+            </a:solidFill>
+          </a:ln>
+          <a:effectLst/>
+        </p:spPr>
+        <p:style>
+          <a:lnRef idx="2">
+            <a:schemeClr val="accent1">
+              <a:shade val="50000"/>
+            </a:schemeClr>
+          </a:lnRef>
+          <a:fillRef idx="1">
+            <a:schemeClr val="accent1"/>
+          </a:fillRef>
+          <a:effectRef idx="0">
+            <a:schemeClr val="accent1"/>
+          </a:effectRef>
+          <a:fontRef idx="minor">
+            <a:schemeClr val="lt1"/>
+          </a:fontRef>
+        </p:style>
+        <p:txBody>
+          <a:bodyPr rtlCol="0" anchor="ctr"/>
+          <a:lstStyle/>
+          <a:p>
+            <a:pPr algn="ctr"/>
+            <a:r>
+              <a:rPr lang="en-US" sz="800" dirty="0" smtClean="0">
+                <a:solidFill>
+                  <a:schemeClr val="tx1">
+                    <a:lumMod val="65000"/>
+                    <a:lumOff val="35000"/>
+                  </a:schemeClr>
+                </a:solidFill>
+              </a:rPr>
+              <a:t>Big 12</a:t>
+            </a:r>
+            <a:endParaRPr lang="en-US" sz="800" dirty="0">
+              <a:solidFill>
+                <a:schemeClr val="tx1">
+                  <a:lumMod val="65000"/>
+                  <a:lumOff val="35000"/>
+                </a:schemeClr>
+              </a:solidFill>
+            </a:endParaRPr>
+          </a:p>
+        </p:txBody>
+      </p:sp>
+      <p:sp>
+        <p:nvSpPr>
+          <p:cNvPr id="101" name="Rounded Rectangle 100"/>
+          <p:cNvSpPr/>
+          <p:nvPr/>
+        </p:nvSpPr>
+        <p:spPr>
+          <a:xfrm>
+            <a:off x="5041365" y="2446930"/>
+            <a:ext cx="586620" cy="137160"/>
+          </a:xfrm>
+          <a:prstGeom prst="roundRect">
+            <a:avLst/>
+          </a:prstGeom>
+          <a:solidFill>
+            <a:schemeClr val="bg1">
+              <a:lumMod val="95000"/>
+            </a:schemeClr>
+          </a:solidFill>
+          <a:ln w="3175">
+            <a:solidFill>
+              <a:schemeClr val="tx1">
+                <a:lumMod val="65000"/>
+                <a:lumOff val="35000"/>
+              </a:schemeClr>
+            </a:solidFill>
+          </a:ln>
+          <a:effectLst/>
+        </p:spPr>
+        <p:style>
+          <a:lnRef idx="2">
+            <a:schemeClr val="accent1">
+              <a:shade val="50000"/>
+            </a:schemeClr>
+          </a:lnRef>
+          <a:fillRef idx="1">
+            <a:schemeClr val="accent1"/>
+          </a:fillRef>
+          <a:effectRef idx="0">
+            <a:schemeClr val="accent1"/>
+          </a:effectRef>
+          <a:fontRef idx="minor">
+            <a:schemeClr val="lt1"/>
+          </a:fontRef>
+        </p:style>
+        <p:txBody>
+          <a:bodyPr rtlCol="0" anchor="ctr"/>
+          <a:lstStyle/>
+          <a:p>
+            <a:pPr algn="ctr"/>
+            <a:r>
+              <a:rPr lang="en-US" sz="800" dirty="0" smtClean="0">
+                <a:solidFill>
+                  <a:schemeClr val="tx1">
+                    <a:lumMod val="65000"/>
+                    <a:lumOff val="35000"/>
+                  </a:schemeClr>
+                </a:solidFill>
+              </a:rPr>
+              <a:t>Big East</a:t>
+            </a:r>
+            <a:endParaRPr lang="en-US" sz="800" dirty="0">
+              <a:solidFill>
+                <a:schemeClr val="tx1">
+                  <a:lumMod val="65000"/>
+                  <a:lumOff val="35000"/>
+                </a:schemeClr>
+              </a:solidFill>
+            </a:endParaRPr>
+          </a:p>
+        </p:txBody>
+      </p:sp>
+      <p:sp>
+        <p:nvSpPr>
+          <p:cNvPr id="102" name="Rounded Rectangle 101"/>
+          <p:cNvSpPr/>
+          <p:nvPr/>
+        </p:nvSpPr>
+        <p:spPr>
+          <a:xfrm>
+            <a:off x="733346" y="4389125"/>
+            <a:ext cx="497419" cy="137160"/>
+          </a:xfrm>
+          <a:prstGeom prst="roundRect">
+            <a:avLst/>
+          </a:prstGeom>
+          <a:solidFill>
+            <a:schemeClr val="bg1">
+              <a:lumMod val="95000"/>
+            </a:schemeClr>
+          </a:solidFill>
+          <a:ln w="3175">
+            <a:solidFill>
+              <a:schemeClr val="tx1">
+                <a:lumMod val="65000"/>
+                <a:lumOff val="35000"/>
+              </a:schemeClr>
+            </a:solidFill>
+          </a:ln>
+          <a:effectLst/>
+        </p:spPr>
+        <p:style>
+          <a:lnRef idx="2">
+            <a:schemeClr val="accent1">
+              <a:shade val="50000"/>
+            </a:schemeClr>
+          </a:lnRef>
+          <a:fillRef idx="1">
+            <a:schemeClr val="accent1"/>
+          </a:fillRef>
+          <a:effectRef idx="0">
+            <a:schemeClr val="accent1"/>
+          </a:effectRef>
+          <a:fontRef idx="minor">
+            <a:schemeClr val="lt1"/>
+          </a:fontRef>
+        </p:style>
+        <p:txBody>
+          <a:bodyPr rtlCol="0" anchor="ctr"/>
+          <a:lstStyle/>
+          <a:p>
+            <a:pPr algn="ctr"/>
+            <a:r>
+              <a:rPr lang="en-US" sz="800" dirty="0" smtClean="0">
+                <a:solidFill>
+                  <a:schemeClr val="tx1">
+                    <a:lumMod val="65000"/>
+                    <a:lumOff val="35000"/>
+                  </a:schemeClr>
+                </a:solidFill>
+              </a:rPr>
+              <a:t>C-USA</a:t>
+            </a:r>
+            <a:endParaRPr lang="en-US" sz="800" dirty="0">
+              <a:solidFill>
+                <a:schemeClr val="tx1">
+                  <a:lumMod val="65000"/>
+                  <a:lumOff val="35000"/>
+                </a:schemeClr>
+              </a:solidFill>
+            </a:endParaRPr>
+          </a:p>
+        </p:txBody>
+      </p:sp>
+      <p:sp>
+        <p:nvSpPr>
+          <p:cNvPr id="103" name="Rounded Rectangle 102"/>
+          <p:cNvSpPr/>
+          <p:nvPr/>
+        </p:nvSpPr>
+        <p:spPr>
+          <a:xfrm>
+            <a:off x="3174386" y="4934161"/>
+            <a:ext cx="478296" cy="137160"/>
+          </a:xfrm>
+          <a:prstGeom prst="roundRect">
+            <a:avLst/>
+          </a:prstGeom>
+          <a:solidFill>
+            <a:schemeClr val="bg1">
+              <a:lumMod val="95000"/>
+            </a:schemeClr>
+          </a:solidFill>
+          <a:ln w="3175">
+            <a:solidFill>
+              <a:schemeClr val="tx1">
+                <a:lumMod val="65000"/>
+                <a:lumOff val="35000"/>
+              </a:schemeClr>
+            </a:solidFill>
+          </a:ln>
+          <a:effectLst/>
+        </p:spPr>
+        <p:style>
+          <a:lnRef idx="2">
+            <a:schemeClr val="accent1">
+              <a:shade val="50000"/>
+            </a:schemeClr>
+          </a:lnRef>
+          <a:fillRef idx="1">
+            <a:schemeClr val="accent1"/>
+          </a:fillRef>
+          <a:effectRef idx="0">
+            <a:schemeClr val="accent1"/>
+          </a:effectRef>
+          <a:fontRef idx="minor">
+            <a:schemeClr val="lt1"/>
+          </a:fontRef>
+        </p:style>
+        <p:txBody>
+          <a:bodyPr rtlCol="0" anchor="ctr"/>
+          <a:lstStyle/>
+          <a:p>
+            <a:pPr algn="ctr"/>
+            <a:r>
+              <a:rPr lang="en-US" sz="800" dirty="0" smtClean="0">
+                <a:solidFill>
+                  <a:schemeClr val="tx1">
+                    <a:lumMod val="65000"/>
+                    <a:lumOff val="35000"/>
+                  </a:schemeClr>
+                </a:solidFill>
+              </a:rPr>
+              <a:t>ACC</a:t>
+            </a:r>
+            <a:endParaRPr lang="en-US" sz="800" dirty="0">
+              <a:solidFill>
+                <a:schemeClr val="tx1">
+                  <a:lumMod val="65000"/>
+                  <a:lumOff val="35000"/>
+                </a:schemeClr>
+              </a:solidFill>
+            </a:endParaRPr>
+          </a:p>
+        </p:txBody>
+      </p:sp>
+      <p:sp>
+        <p:nvSpPr>
+          <p:cNvPr id="104" name="Rounded Rectangle 103"/>
+          <p:cNvSpPr/>
+          <p:nvPr/>
+        </p:nvSpPr>
+        <p:spPr>
+          <a:xfrm>
+            <a:off x="4701241" y="3986129"/>
+            <a:ext cx="775275" cy="274320"/>
+          </a:xfrm>
+          <a:prstGeom prst="roundRect">
+            <a:avLst/>
+          </a:prstGeom>
+          <a:solidFill>
+            <a:schemeClr val="bg1">
+              <a:lumMod val="95000"/>
+            </a:schemeClr>
+          </a:solidFill>
+          <a:ln w="3175">
+            <a:solidFill>
+              <a:schemeClr val="tx1">
+                <a:lumMod val="65000"/>
+                <a:lumOff val="35000"/>
+              </a:schemeClr>
+            </a:solidFill>
+          </a:ln>
+          <a:effectLst/>
+        </p:spPr>
+        <p:style>
+          <a:lnRef idx="2">
+            <a:schemeClr val="accent1">
+              <a:shade val="50000"/>
+            </a:schemeClr>
+          </a:lnRef>
+          <a:fillRef idx="1">
+            <a:schemeClr val="accent1"/>
+          </a:fillRef>
+          <a:effectRef idx="0">
+            <a:schemeClr val="accent1"/>
+          </a:effectRef>
+          <a:fontRef idx="minor">
+            <a:schemeClr val="lt1"/>
+          </a:fontRef>
+        </p:style>
+        <p:txBody>
+          <a:bodyPr rtlCol="0" anchor="ctr"/>
+          <a:lstStyle/>
+          <a:p>
+            <a:pPr algn="ctr"/>
+            <a:r>
+              <a:rPr lang="en-US" sz="800" dirty="0" smtClean="0">
+                <a:solidFill>
+                  <a:schemeClr val="tx1">
+                    <a:lumMod val="65000"/>
+                    <a:lumOff val="35000"/>
+                  </a:schemeClr>
+                </a:solidFill>
+              </a:rPr>
+              <a:t>Mountain West</a:t>
+            </a:r>
+            <a:endParaRPr lang="en-US" sz="800" dirty="0">
+              <a:solidFill>
+                <a:schemeClr val="tx1">
+                  <a:lumMod val="65000"/>
+                  <a:lumOff val="35000"/>
+                </a:schemeClr>
+              </a:solidFill>
+            </a:endParaRPr>
+          </a:p>
+        </p:txBody>
+      </p:sp>
+      <p:cxnSp>
+        <p:nvCxnSpPr>
+          <p:cNvPr id="4" name="Straight Arrow Connector 3"/>
+          <p:cNvCxnSpPr/>
+          <p:nvPr/>
+        </p:nvCxnSpPr>
+        <p:spPr>
+          <a:xfrm flipH="1">
+            <a:off x="5131352" y="4260449"/>
+            <a:ext cx="63748" cy="435916"/>
+          </a:xfrm>
+          <a:prstGeom prst="straightConnector1">
+            <a:avLst/>
+          </a:prstGeom>
+          <a:ln w="3175">
+            <a:solidFill>
+              <a:schemeClr val="tx1">
+                <a:lumMod val="65000"/>
+                <a:lumOff val="35000"/>
+              </a:schemeClr>
+            </a:solidFill>
+            <a:headEnd type="none" w="med" len="med"/>
+            <a:tailEnd type="triangle" w="med" len="med"/>
+          </a:ln>
+        </p:spPr>
+        <p:style>
+          <a:lnRef idx="1">
+            <a:schemeClr val="accent1"/>
+          </a:lnRef>
+          <a:fillRef idx="0">
+            <a:schemeClr val="accent1"/>
+          </a:fillRef>
+          <a:effectRef idx="0">
+            <a:schemeClr val="accent1"/>
+          </a:effectRef>
+          <a:fontRef idx="minor">
+            <a:schemeClr val="tx1"/>
+          </a:fontRef>
+        </p:style>
+      </p:cxnSp>
+      <p:cxnSp>
+        <p:nvCxnSpPr>
+          <p:cNvPr id="105" name="Straight Arrow Connector 104"/>
+          <p:cNvCxnSpPr/>
+          <p:nvPr/>
+        </p:nvCxnSpPr>
+        <p:spPr>
+          <a:xfrm flipH="1">
+            <a:off x="1014057" y="4526409"/>
+            <a:ext cx="31875" cy="285260"/>
+          </a:xfrm>
+          <a:prstGeom prst="straightConnector1">
+            <a:avLst/>
+          </a:prstGeom>
+          <a:ln w="3175">
+            <a:solidFill>
+              <a:schemeClr val="tx1">
+                <a:lumMod val="65000"/>
+                <a:lumOff val="35000"/>
+              </a:schemeClr>
+            </a:solidFill>
+            <a:headEnd type="none" w="med" len="med"/>
+            <a:tailEnd type="triangle" w="med" len="med"/>
+          </a:ln>
+        </p:spPr>
+        <p:style>
+          <a:lnRef idx="1">
+            <a:schemeClr val="accent1"/>
+          </a:lnRef>
+          <a:fillRef idx="0">
+            <a:schemeClr val="accent1"/>
+          </a:fillRef>
+          <a:effectRef idx="0">
+            <a:schemeClr val="accent1"/>
+          </a:effectRef>
+          <a:fontRef idx="minor">
+            <a:schemeClr val="tx1"/>
+          </a:fontRef>
+        </p:style>
+      </p:cxnSp>
+      <p:sp>
+        <p:nvSpPr>
+          <p:cNvPr id="106" name="Rounded Rectangle 105"/>
+          <p:cNvSpPr/>
+          <p:nvPr/>
+        </p:nvSpPr>
+        <p:spPr>
+          <a:xfrm>
+            <a:off x="6578201" y="5157225"/>
+            <a:ext cx="586620" cy="137160"/>
+          </a:xfrm>
+          <a:prstGeom prst="roundRect">
+            <a:avLst/>
+          </a:prstGeom>
+          <a:solidFill>
+            <a:schemeClr val="bg1">
+              <a:lumMod val="95000"/>
+            </a:schemeClr>
+          </a:solidFill>
+          <a:ln w="3175">
+            <a:solidFill>
+              <a:schemeClr val="tx1">
+                <a:lumMod val="65000"/>
+                <a:lumOff val="35000"/>
+              </a:schemeClr>
+            </a:solidFill>
+          </a:ln>
+          <a:effectLst/>
+        </p:spPr>
+        <p:style>
+          <a:lnRef idx="2">
+            <a:schemeClr val="accent1">
+              <a:shade val="50000"/>
+            </a:schemeClr>
+          </a:lnRef>
+          <a:fillRef idx="1">
+            <a:schemeClr val="accent1"/>
+          </a:fillRef>
+          <a:effectRef idx="0">
+            <a:schemeClr val="accent1"/>
+          </a:effectRef>
+          <a:fontRef idx="minor">
+            <a:schemeClr val="lt1"/>
+          </a:fontRef>
+        </p:style>
+        <p:txBody>
+          <a:bodyPr rtlCol="0" anchor="ctr"/>
+          <a:lstStyle/>
+          <a:p>
+            <a:pPr algn="ctr"/>
+            <a:r>
+              <a:rPr lang="en-US" sz="800" dirty="0" smtClean="0">
+                <a:solidFill>
+                  <a:schemeClr val="tx1">
+                    <a:lumMod val="65000"/>
+                    <a:lumOff val="35000"/>
+                  </a:schemeClr>
+                </a:solidFill>
+              </a:rPr>
+              <a:t>Big West</a:t>
+            </a:r>
+            <a:endParaRPr lang="en-US" sz="800" dirty="0">
+              <a:solidFill>
+                <a:schemeClr val="tx1">
+                  <a:lumMod val="65000"/>
+                  <a:lumOff val="35000"/>
+                </a:schemeClr>
+              </a:solidFill>
+            </a:endParaRPr>
+          </a:p>
+        </p:txBody>
+      </p:sp>
+      <p:cxnSp>
+        <p:nvCxnSpPr>
+          <p:cNvPr id="107" name="Straight Arrow Connector 106"/>
+          <p:cNvCxnSpPr/>
+          <p:nvPr/>
+        </p:nvCxnSpPr>
+        <p:spPr>
+          <a:xfrm flipH="1" flipV="1">
+            <a:off x="6914567" y="4791791"/>
+            <a:ext cx="74955" cy="365434"/>
+          </a:xfrm>
+          <a:prstGeom prst="straightConnector1">
+            <a:avLst/>
+          </a:prstGeom>
+          <a:ln w="3175">
+            <a:solidFill>
+              <a:schemeClr val="tx1">
+                <a:lumMod val="65000"/>
+                <a:lumOff val="35000"/>
+              </a:schemeClr>
+            </a:solidFill>
+            <a:headEnd type="none" w="med" len="med"/>
+            <a:tailEnd type="triangle" w="med" len="med"/>
+          </a:ln>
+        </p:spPr>
+        <p:style>
+          <a:lnRef idx="1">
+            <a:schemeClr val="accent1"/>
+          </a:lnRef>
+          <a:fillRef idx="0">
+            <a:schemeClr val="accent1"/>
+          </a:fillRef>
+          <a:effectRef idx="0">
+            <a:schemeClr val="accent1"/>
+          </a:effectRef>
+          <a:fontRef idx="minor">
+            <a:schemeClr val="tx1"/>
+          </a:fontRef>
+        </p:style>
+      </p:cxnSp>
     </p:spTree>
     <p:extLst>
       <p:ext uri="{BB962C8B-B14F-4D97-AF65-F5344CB8AC3E}">

</xml_diff>